<commit_message>
Full Project with ppt
</commit_message>
<xml_diff>
--- a/Project/Final Presentation ML.pptx
+++ b/Project/Final Presentation ML.pptx
@@ -250,7 +250,7 @@
           <a:p>
             <a:fld id="{0DA92EA8-3A0B-4D1D-8FBC-A447931674BE}" type="datetimeFigureOut">
               <a:rPr lang="en-US" smtClean="0"/>
-              <a:t>07-Aug-22</a:t>
+              <a:t>1/29/2024</a:t>
             </a:fld>
             <a:endParaRPr lang="en-US"/>
           </a:p>
@@ -991,7 +991,7 @@
           <a:p>
             <a:fld id="{3B175DD8-8497-49CE-970A-E433073FF0D5}" type="datetimeFigureOut">
               <a:rPr lang="en-US" smtClean="0"/>
-              <a:t>07-Aug-22</a:t>
+              <a:t>1/29/2024</a:t>
             </a:fld>
             <a:endParaRPr lang="en-US"/>
           </a:p>
@@ -1194,7 +1194,7 @@
           <a:p>
             <a:fld id="{3B175DD8-8497-49CE-970A-E433073FF0D5}" type="datetimeFigureOut">
               <a:rPr lang="en-US" smtClean="0"/>
-              <a:t>07-Aug-22</a:t>
+              <a:t>1/29/2024</a:t>
             </a:fld>
             <a:endParaRPr lang="en-US"/>
           </a:p>
@@ -1402,7 +1402,7 @@
           <a:p>
             <a:fld id="{3B175DD8-8497-49CE-970A-E433073FF0D5}" type="datetimeFigureOut">
               <a:rPr lang="en-US" smtClean="0"/>
-              <a:t>07-Aug-22</a:t>
+              <a:t>1/29/2024</a:t>
             </a:fld>
             <a:endParaRPr lang="en-US"/>
           </a:p>
@@ -1589,7 +1589,7 @@
           <a:p>
             <a:fld id="{3B175DD8-8497-49CE-970A-E433073FF0D5}" type="datetimeFigureOut">
               <a:rPr lang="en-US" smtClean="0"/>
-              <a:t>07-Aug-22</a:t>
+              <a:t>1/29/2024</a:t>
             </a:fld>
             <a:endParaRPr lang="en-US"/>
           </a:p>
@@ -3000,7 +3000,7 @@
           <a:p>
             <a:fld id="{3B175DD8-8497-49CE-970A-E433073FF0D5}" type="datetimeFigureOut">
               <a:rPr lang="en-US" smtClean="0"/>
-              <a:t>07-Aug-22</a:t>
+              <a:t>1/29/2024</a:t>
             </a:fld>
             <a:endParaRPr lang="en-US"/>
           </a:p>
@@ -3275,7 +3275,7 @@
           <a:p>
             <a:fld id="{3B175DD8-8497-49CE-970A-E433073FF0D5}" type="datetimeFigureOut">
               <a:rPr lang="en-US" smtClean="0"/>
-              <a:t>07-Aug-22</a:t>
+              <a:t>1/29/2024</a:t>
             </a:fld>
             <a:endParaRPr lang="en-US"/>
           </a:p>
@@ -3540,7 +3540,7 @@
           <a:p>
             <a:fld id="{3B175DD8-8497-49CE-970A-E433073FF0D5}" type="datetimeFigureOut">
               <a:rPr lang="en-US" smtClean="0"/>
-              <a:t>07-Aug-22</a:t>
+              <a:t>1/29/2024</a:t>
             </a:fld>
             <a:endParaRPr lang="en-US"/>
           </a:p>
@@ -3952,7 +3952,7 @@
           <a:p>
             <a:fld id="{3B175DD8-8497-49CE-970A-E433073FF0D5}" type="datetimeFigureOut">
               <a:rPr lang="en-US" smtClean="0"/>
-              <a:t>07-Aug-22</a:t>
+              <a:t>1/29/2024</a:t>
             </a:fld>
             <a:endParaRPr lang="en-US"/>
           </a:p>
@@ -4093,7 +4093,7 @@
           <a:p>
             <a:fld id="{3B175DD8-8497-49CE-970A-E433073FF0D5}" type="datetimeFigureOut">
               <a:rPr lang="en-US" smtClean="0"/>
-              <a:t>07-Aug-22</a:t>
+              <a:t>1/29/2024</a:t>
             </a:fld>
             <a:endParaRPr lang="en-US"/>
           </a:p>
@@ -4206,7 +4206,7 @@
           <a:p>
             <a:fld id="{3B175DD8-8497-49CE-970A-E433073FF0D5}" type="datetimeFigureOut">
               <a:rPr lang="en-US" smtClean="0"/>
-              <a:t>07-Aug-22</a:t>
+              <a:t>1/29/2024</a:t>
             </a:fld>
             <a:endParaRPr lang="en-US"/>
           </a:p>
@@ -4522,7 +4522,7 @@
           <a:p>
             <a:fld id="{3B175DD8-8497-49CE-970A-E433073FF0D5}" type="datetimeFigureOut">
               <a:rPr lang="en-US" smtClean="0"/>
-              <a:t>07-Aug-22</a:t>
+              <a:t>1/29/2024</a:t>
             </a:fld>
             <a:endParaRPr lang="en-US"/>
           </a:p>
@@ -4815,7 +4815,7 @@
           <a:p>
             <a:fld id="{3B175DD8-8497-49CE-970A-E433073FF0D5}" type="datetimeFigureOut">
               <a:rPr lang="en-US" smtClean="0"/>
-              <a:t>07-Aug-22</a:t>
+              <a:t>1/29/2024</a:t>
             </a:fld>
             <a:endParaRPr lang="en-US"/>
           </a:p>
@@ -5056,7 +5056,7 @@
           <a:p>
             <a:fld id="{3B175DD8-8497-49CE-970A-E433073FF0D5}" type="datetimeFigureOut">
               <a:rPr lang="en-US" smtClean="0"/>
-              <a:t>07-Aug-22</a:t>
+              <a:t>1/29/2024</a:t>
             </a:fld>
             <a:endParaRPr lang="en-US"/>
           </a:p>
@@ -5556,8 +5556,13 @@
             <a:pPr algn="ctr"/>
             <a:r>
               <a:rPr lang="en-US" b="1" dirty="0"/>
-              <a:t>MACHINE LEARNING[A]</a:t>
-            </a:r>
+              <a:t>MACHINE </a:t>
+            </a:r>
+            <a:r>
+              <a:rPr lang="en-US" b="1"/>
+              <a:t>LEARNING[D]</a:t>
+            </a:r>
+            <a:endParaRPr lang="en-US" b="1" dirty="0"/>
           </a:p>
           <a:p>
             <a:pPr algn="ctr"/>
@@ -6108,7 +6113,7 @@
           <p:nvPr>
             <p:extLst>
               <p:ext uri="{D42A27DB-BD31-4B8C-83A1-F6EECF244321}">
-                <p14:modId xmlns:p14="http://schemas.microsoft.com/office/powerpoint/2010/main" val="963464618"/>
+                <p14:modId xmlns:p14="http://schemas.microsoft.com/office/powerpoint/2010/main" val="758019109"/>
               </p:ext>
             </p:extLst>
           </p:nvPr>
@@ -6185,7 +6190,7 @@
                         <a:rPr lang="en-US" sz="1800" b="1" i="0" u="none" strike="noStrike" noProof="0" dirty="0">
                           <a:latin typeface="Calibri"/>
                         </a:rPr>
-                        <a:t>Khan, Md. Iftekhar Ahmed</a:t>
+                        <a:t>MD. HAJJAJ BIN SONOSI</a:t>
                       </a:r>
                       <a:endParaRPr lang="en-US" b="1" dirty="0"/>
                     </a:p>
@@ -6202,7 +6207,7 @@
                       </a:pPr>
                       <a:r>
                         <a:rPr lang="en-US" b="1" dirty="0"/>
-                        <a:t>19-41201-2</a:t>
+                        <a:t>20-44346-3</a:t>
                       </a:r>
                     </a:p>
                   </a:txBody>
@@ -6227,7 +6232,7 @@
                         <a:rPr lang="en-US" sz="1800" b="1" i="0" u="none" strike="noStrike" noProof="0" dirty="0">
                           <a:latin typeface="Calibri"/>
                         </a:rPr>
-                        <a:t>Mir, Md Ishmam</a:t>
+                        <a:t>TONMOY DEY</a:t>
                       </a:r>
                       <a:endParaRPr lang="en-US" b="1" dirty="0"/>
                     </a:p>
@@ -6246,7 +6251,7 @@
                         <a:rPr lang="en-US" sz="1800" b="1" i="0" u="none" strike="noStrike" noProof="0" dirty="0">
                           <a:latin typeface="Calibri"/>
                         </a:rPr>
-                        <a:t>19-39925-1</a:t>
+                        <a:t>20-44206-3</a:t>
                       </a:r>
                       <a:endParaRPr lang="en-US" b="1" dirty="0"/>
                     </a:p>
@@ -6269,12 +6274,8 @@
                         <a:buNone/>
                       </a:pPr>
                       <a:r>
-                        <a:rPr lang="en-US" b="1" dirty="0" err="1"/>
-                        <a:t>Shium</a:t>
-                      </a:r>
-                      <a:r>
                         <a:rPr lang="en-US" b="1" dirty="0"/>
-                        <a:t>, Sheikh Mahmudul Hasan</a:t>
+                        <a:t>MD. ABDUL MUNEEM ADNAN</a:t>
                       </a:r>
                     </a:p>
                   </a:txBody>
@@ -6290,7 +6291,7 @@
                       </a:pPr>
                       <a:r>
                         <a:rPr lang="en-US" b="1" dirty="0"/>
-                        <a:t>19-40764-2</a:t>
+                        <a:t>20-44213-3</a:t>
                       </a:r>
                     </a:p>
                   </a:txBody>
@@ -6315,19 +6316,7 @@
                         <a:rPr lang="en-US" sz="1800" b="1" i="0" u="none" strike="noStrike" noProof="0" dirty="0">
                           <a:latin typeface="Calibri"/>
                         </a:rPr>
-                        <a:t>Sumit </a:t>
-                      </a:r>
-                      <a:r>
-                        <a:rPr lang="en-US" sz="1800" b="1" i="0" u="none" strike="noStrike" noProof="0" dirty="0" err="1">
-                          <a:latin typeface="Calibri"/>
-                        </a:rPr>
-                        <a:t>kanti</a:t>
-                      </a:r>
-                      <a:r>
-                        <a:rPr lang="en-US" sz="1800" b="1" i="0" u="none" strike="noStrike" noProof="0" dirty="0">
-                          <a:latin typeface="Calibri"/>
-                        </a:rPr>
-                        <a:t> Sarker</a:t>
+                        <a:t>WALED KARIM</a:t>
                       </a:r>
                       <a:endParaRPr lang="en-US" b="1" dirty="0"/>
                     </a:p>
@@ -6346,7 +6335,7 @@
                         <a:rPr lang="en-US" sz="1800" b="1" i="0" u="none" strike="noStrike" noProof="0" dirty="0">
                           <a:latin typeface="Calibri"/>
                         </a:rPr>
-                        <a:t>19-41764-3</a:t>
+                        <a:t>20-44282-3</a:t>
                       </a:r>
                       <a:endParaRPr lang="en-US" b="1" dirty="0"/>
                     </a:p>
@@ -11139,20 +11128,20 @@
 </file>
 
 <file path=customXml/item1.xml><?xml version="1.0" encoding="utf-8"?>
+<p:properties xmlns:p="http://schemas.microsoft.com/office/2006/metadata/properties" xmlns:xsi="http://www.w3.org/2001/XMLSchema-instance" xmlns:pc="http://schemas.microsoft.com/office/infopath/2007/PartnerControls">
+  <documentManagement>
+    <ReferenceId xmlns="b47806cc-f0ff-4191-bb0b-9070a8a606cb" xsi:nil="true"/>
+  </documentManagement>
+</p:properties>
+</file>
+
+<file path=customXml/item2.xml><?xml version="1.0" encoding="utf-8"?>
 <?mso-contentType ?>
 <FormTemplates xmlns="http://schemas.microsoft.com/sharepoint/v3/contenttype/forms">
   <Display>DocumentLibraryForm</Display>
   <Edit>DocumentLibraryForm</Edit>
   <New>DocumentLibraryForm</New>
 </FormTemplates>
-</file>
-
-<file path=customXml/item2.xml><?xml version="1.0" encoding="utf-8"?>
-<p:properties xmlns:p="http://schemas.microsoft.com/office/2006/metadata/properties" xmlns:xsi="http://www.w3.org/2001/XMLSchema-instance" xmlns:pc="http://schemas.microsoft.com/office/infopath/2007/PartnerControls">
-  <documentManagement>
-    <ReferenceId xmlns="b47806cc-f0ff-4191-bb0b-9070a8a606cb" xsi:nil="true"/>
-  </documentManagement>
-</p:properties>
 </file>
 
 <file path=customXml/item3.xml><?xml version="1.0" encoding="utf-8"?>
@@ -11308,19 +11297,19 @@
 </file>
 
 <file path=customXml/itemProps1.xml><?xml version="1.0" encoding="utf-8"?>
-<ds:datastoreItem xmlns:ds="http://schemas.openxmlformats.org/officeDocument/2006/customXml" ds:itemID="{31082B55-E139-42D5-9DB2-635D0CD3E7A0}">
+<ds:datastoreItem xmlns:ds="http://schemas.openxmlformats.org/officeDocument/2006/customXml" ds:itemID="{37BA2783-B074-427C-BE0F-E77BD785EDE7}">
   <ds:schemaRefs>
-    <ds:schemaRef ds:uri="http://schemas.microsoft.com/sharepoint/v3/contenttype/forms"/>
+    <ds:schemaRef ds:uri="http://schemas.microsoft.com/office/2006/metadata/properties"/>
+    <ds:schemaRef ds:uri="http://schemas.microsoft.com/office/infopath/2007/PartnerControls"/>
+    <ds:schemaRef ds:uri="b47806cc-f0ff-4191-bb0b-9070a8a606cb"/>
   </ds:schemaRefs>
 </ds:datastoreItem>
 </file>
 
 <file path=customXml/itemProps2.xml><?xml version="1.0" encoding="utf-8"?>
-<ds:datastoreItem xmlns:ds="http://schemas.openxmlformats.org/officeDocument/2006/customXml" ds:itemID="{37BA2783-B074-427C-BE0F-E77BD785EDE7}">
+<ds:datastoreItem xmlns:ds="http://schemas.openxmlformats.org/officeDocument/2006/customXml" ds:itemID="{31082B55-E139-42D5-9DB2-635D0CD3E7A0}">
   <ds:schemaRefs>
-    <ds:schemaRef ds:uri="http://schemas.microsoft.com/office/2006/metadata/properties"/>
-    <ds:schemaRef ds:uri="http://schemas.microsoft.com/office/infopath/2007/PartnerControls"/>
-    <ds:schemaRef ds:uri="b47806cc-f0ff-4191-bb0b-9070a8a606cb"/>
+    <ds:schemaRef ds:uri="http://schemas.microsoft.com/sharepoint/v3/contenttype/forms"/>
   </ds:schemaRefs>
 </ds:datastoreItem>
 </file>

</xml_diff>